<commit_message>
More work on the Mutexes lecture and a producer/consumer queue example.
</commit_message>
<xml_diff>
--- a/Lectures/Mutexes/Mutexes.pptx
+++ b/Lectures/Mutexes/Mutexes.pptx
@@ -5,7 +5,7 @@
     <p:sldMasterId id="2147483660" r:id="rId1"/>
   </p:sldMasterIdLst>
   <p:notesMasterIdLst>
-    <p:notesMasterId r:id="rId7"/>
+    <p:notesMasterId r:id="rId10"/>
   </p:notesMasterIdLst>
   <p:sldIdLst>
     <p:sldId id="256" r:id="rId2"/>
@@ -13,6 +13,9 @@
     <p:sldId id="258" r:id="rId4"/>
     <p:sldId id="259" r:id="rId5"/>
     <p:sldId id="260" r:id="rId6"/>
+    <p:sldId id="261" r:id="rId7"/>
+    <p:sldId id="262" r:id="rId8"/>
+    <p:sldId id="263" r:id="rId9"/>
   </p:sldIdLst>
   <p:sldSz cx="9144000" cy="6858000" type="screen4x3"/>
   <p:notesSz cx="6858000" cy="9144000"/>
@@ -196,7 +199,7 @@
           <a:p>
             <a:fld id="{DBE0ECA1-3FBF-48AE-AD2A-4439AE745E19}" type="datetimeFigureOut">
               <a:rPr lang="en-US" smtClean="0"/>
-              <a:t>11/5/2013</a:t>
+              <a:t>11/8/2013</a:t>
             </a:fld>
             <a:endParaRPr lang="en-US"/>
           </a:p>
@@ -657,7 +660,7 @@
           <a:p>
             <a:fld id="{9769DED8-28D4-45B9-A00F-7CFE9335FEA6}" type="datetime1">
               <a:rPr lang="en-US" smtClean="0"/>
-              <a:t>11/5/2013</a:t>
+              <a:t>11/8/2013</a:t>
             </a:fld>
             <a:endParaRPr lang="en-US"/>
           </a:p>
@@ -922,7 +925,7 @@
           <a:p>
             <a:fld id="{2DB3D439-1F88-44B4-B5F7-F9BCD4064257}" type="datetime1">
               <a:rPr lang="en-US" smtClean="0"/>
-              <a:t>11/5/2013</a:t>
+              <a:t>11/8/2013</a:t>
             </a:fld>
             <a:endParaRPr lang="en-US"/>
           </a:p>
@@ -1097,7 +1100,7 @@
           <a:p>
             <a:fld id="{99C5638F-6F55-4055-935C-67841BE78C36}" type="datetime1">
               <a:rPr lang="en-US" smtClean="0"/>
-              <a:t>11/5/2013</a:t>
+              <a:t>11/8/2013</a:t>
             </a:fld>
             <a:endParaRPr lang="en-US"/>
           </a:p>
@@ -1262,7 +1265,7 @@
           <a:p>
             <a:fld id="{E6987D90-0C92-4B22-A29D-FED15412CED2}" type="datetime1">
               <a:rPr lang="en-US" smtClean="0"/>
-              <a:t>11/5/2013</a:t>
+              <a:t>11/8/2013</a:t>
             </a:fld>
             <a:endParaRPr lang="en-US"/>
           </a:p>
@@ -1511,7 +1514,7 @@
           <a:p>
             <a:fld id="{DDB67BC4-9554-49E0-BCB3-D1EF965BA0B8}" type="datetime1">
               <a:rPr lang="en-US" smtClean="0"/>
-              <a:t>11/5/2013</a:t>
+              <a:t>11/8/2013</a:t>
             </a:fld>
             <a:endParaRPr lang="en-US"/>
           </a:p>
@@ -1794,7 +1797,7 @@
           <a:p>
             <a:fld id="{EC24D770-803D-4E01-921C-9C100DD8230C}" type="datetime1">
               <a:rPr lang="en-US" smtClean="0"/>
-              <a:t>11/5/2013</a:t>
+              <a:t>11/8/2013</a:t>
             </a:fld>
             <a:endParaRPr lang="en-US"/>
           </a:p>
@@ -2233,7 +2236,7 @@
           <a:p>
             <a:fld id="{356AD44B-78A4-4209-8070-7DCBE2DC4992}" type="datetime1">
               <a:rPr lang="en-US" smtClean="0"/>
-              <a:t>11/5/2013</a:t>
+              <a:t>11/8/2013</a:t>
             </a:fld>
             <a:endParaRPr lang="en-US"/>
           </a:p>
@@ -2346,7 +2349,7 @@
           <a:p>
             <a:fld id="{A993C59A-7CA2-467F-B7F1-9096881A01B8}" type="datetime1">
               <a:rPr lang="en-US" smtClean="0"/>
-              <a:t>11/5/2013</a:t>
+              <a:t>11/8/2013</a:t>
             </a:fld>
             <a:endParaRPr lang="en-US"/>
           </a:p>
@@ -2436,7 +2439,7 @@
           <a:p>
             <a:fld id="{2B6B58D0-2488-434A-8ED1-692E09B85CC5}" type="datetime1">
               <a:rPr lang="en-US" smtClean="0"/>
-              <a:t>11/5/2013</a:t>
+              <a:t>11/8/2013</a:t>
             </a:fld>
             <a:endParaRPr lang="en-US"/>
           </a:p>
@@ -2678,7 +2681,7 @@
           <a:p>
             <a:fld id="{FDB0AFC2-7D64-4F61-A7B7-9932D3305DDA}" type="datetime1">
               <a:rPr lang="en-US" smtClean="0"/>
-              <a:t>11/5/2013</a:t>
+              <a:t>11/8/2013</a:t>
             </a:fld>
             <a:endParaRPr lang="en-US"/>
           </a:p>
@@ -2972,7 +2975,7 @@
           <a:p>
             <a:fld id="{4983D17A-D7B2-4ECE-8A2C-93679B9D177B}" type="datetime1">
               <a:rPr lang="en-US" smtClean="0"/>
-              <a:t>11/5/2013</a:t>
+              <a:t>11/8/2013</a:t>
             </a:fld>
             <a:endParaRPr lang="en-US"/>
           </a:p>
@@ -3266,7 +3269,7 @@
           <a:p>
             <a:fld id="{2A5275F7-419E-4C23-8A3D-2EE5742B2EC9}" type="datetime1">
               <a:rPr lang="en-US" smtClean="0"/>
-              <a:t>11/5/2013</a:t>
+              <a:t>11/8/2013</a:t>
             </a:fld>
             <a:endParaRPr lang="en-US"/>
           </a:p>
@@ -3768,12 +3771,8 @@
           <a:lstStyle/>
           <a:p>
             <a:r>
-              <a:rPr lang="en-US" sz="4800" dirty="0" err="1" smtClean="0"/>
-              <a:t>Mutexes</a:t>
-            </a:r>
-            <a:r>
               <a:rPr lang="en-US" sz="4800" dirty="0" smtClean="0"/>
-              <a:t> and shared data</a:t>
+              <a:t>Mutexes and shared data</a:t>
             </a:r>
             <a:endParaRPr lang="en-US" sz="4800" dirty="0"/>
           </a:p>
@@ -4179,6 +4178,29 @@
           </a:p>
         </p:txBody>
       </p:sp>
+      <p:sp>
+        <p:nvSpPr>
+          <p:cNvPr id="5" name="Footer Placeholder 4"/>
+          <p:cNvSpPr>
+            <a:spLocks noGrp="1"/>
+          </p:cNvSpPr>
+          <p:nvPr>
+            <p:ph type="ftr" sz="quarter" idx="11"/>
+          </p:nvPr>
+        </p:nvSpPr>
+        <p:spPr/>
+        <p:txBody>
+          <a:bodyPr/>
+          <a:lstStyle/>
+          <a:p>
+            <a:r>
+              <a:rPr lang="en-US" smtClean="0"/>
+              <a:t>Source: Williams, Chapter 3</a:t>
+            </a:r>
+            <a:endParaRPr lang="en-US"/>
+          </a:p>
+        </p:txBody>
+      </p:sp>
     </p:spTree>
     <p:extLst>
       <p:ext uri="{BB962C8B-B14F-4D97-AF65-F5344CB8AC3E}">
@@ -4189,6 +4211,13 @@
   <p:clrMapOvr>
     <a:masterClrMapping/>
   </p:clrMapOvr>
+  <p:timing>
+    <p:tnLst>
+      <p:par>
+        <p:cTn id="1" dur="indefinite" restart="never" nodeType="tmRoot"/>
+      </p:par>
+    </p:tnLst>
+  </p:timing>
 </p:sld>
 </file>
 
@@ -4288,6 +4317,13 @@
   <p:clrMapOvr>
     <a:masterClrMapping/>
   </p:clrMapOvr>
+  <p:timing>
+    <p:tnLst>
+      <p:par>
+        <p:cTn id="1" dur="indefinite" restart="never" nodeType="tmRoot"/>
+      </p:par>
+    </p:tnLst>
+  </p:timing>
 </p:sld>
 </file>
 
@@ -4365,7 +4401,7 @@
               <a:t>A </a:t>
             </a:r>
             <a:r>
-              <a:rPr lang="en-US" i="1" dirty="0" err="1" smtClean="0"/>
+              <a:rPr lang="en-US" i="1" dirty="0" smtClean="0"/>
               <a:t>mutex</a:t>
             </a:r>
             <a:r>
@@ -4377,15 +4413,7 @@
             <a:pPr marL="1485900" lvl="2" indent="-342900"/>
             <a:r>
               <a:rPr lang="en-US" dirty="0" smtClean="0"/>
-              <a:t>A </a:t>
-            </a:r>
-            <a:r>
-              <a:rPr lang="en-US" dirty="0" err="1" smtClean="0"/>
-              <a:t>mutex</a:t>
-            </a:r>
-            <a:r>
-              <a:rPr lang="en-US" dirty="0" smtClean="0"/>
-              <a:t> is locked to prevent sharing</a:t>
+              <a:t>A mutex is locked to prevent sharing</a:t>
             </a:r>
           </a:p>
           <a:p>
@@ -4399,27 +4427,14 @@
             <a:pPr marL="800100" lvl="1" indent="-342900"/>
             <a:r>
               <a:rPr lang="en-US" dirty="0" smtClean="0"/>
-              <a:t>A thread must wait for a locked </a:t>
-            </a:r>
-            <a:r>
-              <a:rPr lang="en-US" dirty="0" err="1" smtClean="0"/>
-              <a:t>mutex</a:t>
-            </a:r>
-            <a:endParaRPr lang="en-US" dirty="0" smtClean="0"/>
+              <a:t>A thread must wait for a locked mutex</a:t>
+            </a:r>
           </a:p>
           <a:p>
             <a:pPr marL="800100" lvl="1" indent="-342900"/>
             <a:r>
               <a:rPr lang="en-US" dirty="0" smtClean="0"/>
-              <a:t>A </a:t>
-            </a:r>
-            <a:r>
-              <a:rPr lang="en-US" dirty="0" err="1" smtClean="0"/>
-              <a:t>mutex</a:t>
-            </a:r>
-            <a:r>
-              <a:rPr lang="en-US" dirty="0" smtClean="0"/>
-              <a:t> is shared data, that prevents other data from being shared</a:t>
+              <a:t>A mutex is shared data, that prevents other data from being shared</a:t>
             </a:r>
           </a:p>
           <a:p>
@@ -4430,21 +4445,15 @@
             <a:pPr marL="342900" indent="-342900"/>
             <a:r>
               <a:rPr lang="en-US" dirty="0" smtClean="0"/>
-              <a:t>Let’s use a </a:t>
-            </a:r>
-            <a:r>
-              <a:rPr lang="en-US" dirty="0" err="1" smtClean="0"/>
-              <a:t>mutex</a:t>
-            </a:r>
+              <a:t>Let’s use a mutex to eliminate the data race</a:t>
+            </a:r>
+          </a:p>
+          <a:p>
+            <a:pPr marL="342900" indent="-342900"/>
             <a:r>
               <a:rPr lang="en-US" dirty="0" smtClean="0"/>
-              <a:t> to eliminate the </a:t>
-            </a:r>
-            <a:r>
-              <a:rPr lang="en-US" smtClean="0"/>
-              <a:t>data race</a:t>
-            </a:r>
-            <a:endParaRPr lang="en-US" dirty="0" smtClean="0"/>
+              <a:t>What is wrong with this code?</a:t>
+            </a:r>
           </a:p>
         </p:txBody>
       </p:sp>
@@ -4467,6 +4476,29 @@
               <a:rPr lang="en-US" smtClean="0"/>
               <a:t>5</a:t>
             </a:fld>
+            <a:endParaRPr lang="en-US"/>
+          </a:p>
+        </p:txBody>
+      </p:sp>
+      <p:sp>
+        <p:nvSpPr>
+          <p:cNvPr id="5" name="Footer Placeholder 4"/>
+          <p:cNvSpPr>
+            <a:spLocks noGrp="1"/>
+          </p:cNvSpPr>
+          <p:nvPr>
+            <p:ph type="ftr" sz="quarter" idx="11"/>
+          </p:nvPr>
+        </p:nvSpPr>
+        <p:spPr/>
+        <p:txBody>
+          <a:bodyPr/>
+          <a:lstStyle/>
+          <a:p>
+            <a:r>
+              <a:rPr lang="en-US" smtClean="0"/>
+              <a:t>Source: Williams, Chapter 3</a:t>
+            </a:r>
             <a:endParaRPr lang="en-US"/>
           </a:p>
         </p:txBody>
@@ -4475,6 +4507,634 @@
     <p:extLst>
       <p:ext uri="{BB962C8B-B14F-4D97-AF65-F5344CB8AC3E}">
         <p14:creationId xmlns:p14="http://schemas.microsoft.com/office/powerpoint/2010/main" val="984277491"/>
+      </p:ext>
+    </p:extLst>
+  </p:cSld>
+  <p:clrMapOvr>
+    <a:masterClrMapping/>
+  </p:clrMapOvr>
+  <p:timing>
+    <p:tnLst>
+      <p:par>
+        <p:cTn id="1" dur="indefinite" restart="never" nodeType="tmRoot">
+          <p:childTnLst>
+            <p:seq concurrent="1" nextAc="seek">
+              <p:cTn id="2" dur="indefinite" nodeType="mainSeq">
+                <p:childTnLst>
+                  <p:par>
+                    <p:cTn id="3" fill="hold">
+                      <p:stCondLst>
+                        <p:cond delay="indefinite"/>
+                      </p:stCondLst>
+                      <p:childTnLst>
+                        <p:par>
+                          <p:cTn id="4" fill="hold">
+                            <p:stCondLst>
+                              <p:cond delay="0"/>
+                            </p:stCondLst>
+                            <p:childTnLst>
+                              <p:par>
+                                <p:cTn id="5" presetID="1" presetClass="entr" presetSubtype="0" fill="hold" nodeType="clickEffect">
+                                  <p:stCondLst>
+                                    <p:cond delay="0"/>
+                                  </p:stCondLst>
+                                  <p:childTnLst>
+                                    <p:set>
+                                      <p:cBhvr>
+                                        <p:cTn id="6" dur="1" fill="hold">
+                                          <p:stCondLst>
+                                            <p:cond delay="0"/>
+                                          </p:stCondLst>
+                                        </p:cTn>
+                                        <p:tgtEl>
+                                          <p:spTgt spid="3">
+                                            <p:txEl>
+                                              <p:pRg st="9" end="9"/>
+                                            </p:txEl>
+                                          </p:spTgt>
+                                        </p:tgtEl>
+                                        <p:attrNameLst>
+                                          <p:attrName>style.visibility</p:attrName>
+                                        </p:attrNameLst>
+                                      </p:cBhvr>
+                                      <p:to>
+                                        <p:strVal val="visible"/>
+                                      </p:to>
+                                    </p:set>
+                                  </p:childTnLst>
+                                </p:cTn>
+                              </p:par>
+                            </p:childTnLst>
+                          </p:cTn>
+                        </p:par>
+                      </p:childTnLst>
+                    </p:cTn>
+                  </p:par>
+                </p:childTnLst>
+              </p:cTn>
+              <p:prevCondLst>
+                <p:cond evt="onPrev" delay="0">
+                  <p:tgtEl>
+                    <p:sldTgt/>
+                  </p:tgtEl>
+                </p:cond>
+              </p:prevCondLst>
+              <p:nextCondLst>
+                <p:cond evt="onNext" delay="0">
+                  <p:tgtEl>
+                    <p:sldTgt/>
+                  </p:tgtEl>
+                </p:cond>
+              </p:nextCondLst>
+            </p:seq>
+          </p:childTnLst>
+        </p:cTn>
+      </p:par>
+    </p:tnLst>
+  </p:timing>
+</p:sld>
+</file>
+
+<file path=ppt/slides/slide6.xml><?xml version="1.0" encoding="utf-8"?>
+<p:sld xmlns:a="http://schemas.openxmlformats.org/drawingml/2006/main" xmlns:r="http://schemas.openxmlformats.org/officeDocument/2006/relationships" xmlns:p="http://schemas.openxmlformats.org/presentationml/2006/main">
+  <p:cSld>
+    <p:spTree>
+      <p:nvGrpSpPr>
+        <p:cNvPr id="1" name=""/>
+        <p:cNvGrpSpPr/>
+        <p:nvPr/>
+      </p:nvGrpSpPr>
+      <p:grpSpPr>
+        <a:xfrm>
+          <a:off x="0" y="0"/>
+          <a:ext cx="0" cy="0"/>
+          <a:chOff x="0" y="0"/>
+          <a:chExt cx="0" cy="0"/>
+        </a:xfrm>
+      </p:grpSpPr>
+      <p:sp>
+        <p:nvSpPr>
+          <p:cNvPr id="2" name="Title 1"/>
+          <p:cNvSpPr>
+            <a:spLocks noGrp="1"/>
+          </p:cNvSpPr>
+          <p:nvPr>
+            <p:ph type="title"/>
+          </p:nvPr>
+        </p:nvSpPr>
+        <p:spPr/>
+        <p:txBody>
+          <a:bodyPr/>
+          <a:lstStyle/>
+          <a:p>
+            <a:r>
+              <a:rPr lang="en-US" dirty="0" smtClean="0"/>
+              <a:t>RAII to the rescue</a:t>
+            </a:r>
+            <a:endParaRPr lang="en-US" dirty="0"/>
+          </a:p>
+        </p:txBody>
+      </p:sp>
+      <p:sp>
+        <p:nvSpPr>
+          <p:cNvPr id="3" name="Content Placeholder 2"/>
+          <p:cNvSpPr>
+            <a:spLocks noGrp="1"/>
+          </p:cNvSpPr>
+          <p:nvPr>
+            <p:ph idx="1"/>
+          </p:nvPr>
+        </p:nvSpPr>
+        <p:spPr/>
+        <p:txBody>
+          <a:bodyPr/>
+          <a:lstStyle/>
+          <a:p>
+            <a:r>
+              <a:rPr lang="en-US" dirty="0" smtClean="0"/>
+              <a:t>The code </a:t>
+            </a:r>
+            <a:r>
+              <a:rPr lang="en-US" i="1" dirty="0" smtClean="0"/>
+              <a:t>must</a:t>
+            </a:r>
+            <a:r>
+              <a:rPr lang="en-US" dirty="0" smtClean="0"/>
+              <a:t> unlock the mutex on all code paths</a:t>
+            </a:r>
+          </a:p>
+          <a:p>
+            <a:pPr marL="800100" lvl="1" indent="-342900"/>
+            <a:r>
+              <a:rPr lang="en-US" dirty="0" smtClean="0"/>
+              <a:t>An exception will prevent the mutex from being unlocked</a:t>
+            </a:r>
+          </a:p>
+          <a:p>
+            <a:pPr marL="800100" lvl="1" indent="-342900"/>
+            <a:r>
+              <a:rPr lang="en-US" dirty="0" smtClean="0"/>
+              <a:t>A new return statement will prevent the mutex from being unlocked</a:t>
+            </a:r>
+          </a:p>
+          <a:p>
+            <a:r>
+              <a:rPr lang="en-US" dirty="0" smtClean="0">
+                <a:solidFill>
+                  <a:schemeClr val="accent3"/>
+                </a:solidFill>
+              </a:rPr>
+              <a:t>Guidelines: </a:t>
+            </a:r>
+          </a:p>
+          <a:p>
+            <a:pPr marL="800100" lvl="1" indent="-342900"/>
+            <a:r>
+              <a:rPr lang="en-US" dirty="0" smtClean="0">
+                <a:solidFill>
+                  <a:schemeClr val="accent3"/>
+                </a:solidFill>
+              </a:rPr>
+              <a:t>Don’t call lock or unlock on a </a:t>
+            </a:r>
+            <a:r>
+              <a:rPr lang="en-US" dirty="0" err="1" smtClean="0">
+                <a:solidFill>
+                  <a:schemeClr val="accent3"/>
+                </a:solidFill>
+                <a:latin typeface="Courier New" panose="02070309020205020404" pitchFamily="49" charset="0"/>
+                <a:cs typeface="Courier New" panose="02070309020205020404" pitchFamily="49" charset="0"/>
+              </a:rPr>
+              <a:t>std</a:t>
+            </a:r>
+            <a:r>
+              <a:rPr lang="en-US" dirty="0" smtClean="0">
+                <a:solidFill>
+                  <a:schemeClr val="accent3"/>
+                </a:solidFill>
+                <a:latin typeface="Courier New" panose="02070309020205020404" pitchFamily="49" charset="0"/>
+                <a:cs typeface="Courier New" panose="02070309020205020404" pitchFamily="49" charset="0"/>
+              </a:rPr>
+              <a:t>::mutex</a:t>
+            </a:r>
+            <a:r>
+              <a:rPr lang="en-US" dirty="0" smtClean="0">
+                <a:solidFill>
+                  <a:schemeClr val="accent3"/>
+                </a:solidFill>
+              </a:rPr>
+              <a:t> object</a:t>
+            </a:r>
+          </a:p>
+          <a:p>
+            <a:pPr marL="800100" lvl="1" indent="-342900"/>
+            <a:r>
+              <a:rPr lang="en-US" dirty="0" smtClean="0">
+                <a:solidFill>
+                  <a:schemeClr val="accent3"/>
+                </a:solidFill>
+              </a:rPr>
+              <a:t>Do use </a:t>
+            </a:r>
+            <a:r>
+              <a:rPr lang="en-US" dirty="0" err="1" smtClean="0">
+                <a:solidFill>
+                  <a:schemeClr val="accent3"/>
+                </a:solidFill>
+                <a:latin typeface="Courier New" panose="02070309020205020404" pitchFamily="49" charset="0"/>
+                <a:cs typeface="Courier New" panose="02070309020205020404" pitchFamily="49" charset="0"/>
+              </a:rPr>
+              <a:t>std</a:t>
+            </a:r>
+            <a:r>
+              <a:rPr lang="en-US" dirty="0" smtClean="0">
+                <a:solidFill>
+                  <a:schemeClr val="accent3"/>
+                </a:solidFill>
+                <a:latin typeface="Courier New" panose="02070309020205020404" pitchFamily="49" charset="0"/>
+                <a:cs typeface="Courier New" panose="02070309020205020404" pitchFamily="49" charset="0"/>
+              </a:rPr>
+              <a:t>::</a:t>
+            </a:r>
+            <a:r>
+              <a:rPr lang="en-US" dirty="0" err="1" smtClean="0">
+                <a:solidFill>
+                  <a:schemeClr val="accent3"/>
+                </a:solidFill>
+                <a:latin typeface="Courier New" panose="02070309020205020404" pitchFamily="49" charset="0"/>
+                <a:cs typeface="Courier New" panose="02070309020205020404" pitchFamily="49" charset="0"/>
+              </a:rPr>
+              <a:t>lock_guard</a:t>
+            </a:r>
+            <a:r>
+              <a:rPr lang="en-US" dirty="0" smtClean="0">
+                <a:solidFill>
+                  <a:schemeClr val="accent3"/>
+                </a:solidFill>
+              </a:rPr>
+              <a:t> with each </a:t>
+            </a:r>
+            <a:r>
+              <a:rPr lang="en-US" dirty="0" err="1" smtClean="0">
+                <a:solidFill>
+                  <a:schemeClr val="accent3"/>
+                </a:solidFill>
+                <a:latin typeface="Courier New" panose="02070309020205020404" pitchFamily="49" charset="0"/>
+                <a:cs typeface="Courier New" panose="02070309020205020404" pitchFamily="49" charset="0"/>
+              </a:rPr>
+              <a:t>std</a:t>
+            </a:r>
+            <a:r>
+              <a:rPr lang="en-US" dirty="0" smtClean="0">
+                <a:solidFill>
+                  <a:schemeClr val="accent3"/>
+                </a:solidFill>
+                <a:latin typeface="Courier New" panose="02070309020205020404" pitchFamily="49" charset="0"/>
+                <a:cs typeface="Courier New" panose="02070309020205020404" pitchFamily="49" charset="0"/>
+              </a:rPr>
+              <a:t>::mutex</a:t>
+            </a:r>
+          </a:p>
+          <a:p>
+            <a:pPr marL="342900" indent="-342900"/>
+            <a:endParaRPr lang="en-US" dirty="0">
+              <a:solidFill>
+                <a:schemeClr val="accent3"/>
+              </a:solidFill>
+              <a:latin typeface="Courier New" panose="02070309020205020404" pitchFamily="49" charset="0"/>
+              <a:cs typeface="Courier New" panose="02070309020205020404" pitchFamily="49" charset="0"/>
+            </a:endParaRPr>
+          </a:p>
+          <a:p>
+            <a:pPr marL="342900" indent="-342900"/>
+            <a:r>
+              <a:rPr lang="en-US" dirty="0" smtClean="0">
+                <a:cs typeface="Courier New" panose="02070309020205020404" pitchFamily="49" charset="0"/>
+              </a:rPr>
+              <a:t>Let’s improve the code</a:t>
+            </a:r>
+            <a:endParaRPr lang="en-US" dirty="0">
+              <a:cs typeface="Courier New" panose="02070309020205020404" pitchFamily="49" charset="0"/>
+            </a:endParaRPr>
+          </a:p>
+        </p:txBody>
+      </p:sp>
+      <p:sp>
+        <p:nvSpPr>
+          <p:cNvPr id="4" name="Slide Number Placeholder 3"/>
+          <p:cNvSpPr>
+            <a:spLocks noGrp="1"/>
+          </p:cNvSpPr>
+          <p:nvPr>
+            <p:ph type="sldNum" sz="quarter" idx="12"/>
+          </p:nvPr>
+        </p:nvSpPr>
+        <p:spPr/>
+        <p:txBody>
+          <a:bodyPr/>
+          <a:lstStyle/>
+          <a:p>
+            <a:fld id="{6DA12B36-9664-4CB0-8B2E-F4A2F44AE97E}" type="slidenum">
+              <a:rPr lang="en-US" smtClean="0"/>
+              <a:t>6</a:t>
+            </a:fld>
+            <a:endParaRPr lang="en-US"/>
+          </a:p>
+        </p:txBody>
+      </p:sp>
+      <p:sp>
+        <p:nvSpPr>
+          <p:cNvPr id="5" name="Footer Placeholder 4"/>
+          <p:cNvSpPr>
+            <a:spLocks noGrp="1"/>
+          </p:cNvSpPr>
+          <p:nvPr>
+            <p:ph type="ftr" sz="quarter" idx="11"/>
+          </p:nvPr>
+        </p:nvSpPr>
+        <p:spPr/>
+        <p:txBody>
+          <a:bodyPr/>
+          <a:lstStyle/>
+          <a:p>
+            <a:r>
+              <a:rPr lang="en-US" smtClean="0"/>
+              <a:t>Source: Williams, Chapter 3</a:t>
+            </a:r>
+            <a:endParaRPr lang="en-US"/>
+          </a:p>
+        </p:txBody>
+      </p:sp>
+    </p:spTree>
+    <p:extLst>
+      <p:ext uri="{BB962C8B-B14F-4D97-AF65-F5344CB8AC3E}">
+        <p14:creationId xmlns:p14="http://schemas.microsoft.com/office/powerpoint/2010/main" val="1106409459"/>
+      </p:ext>
+    </p:extLst>
+  </p:cSld>
+  <p:clrMapOvr>
+    <a:masterClrMapping/>
+  </p:clrMapOvr>
+  <p:timing>
+    <p:tnLst>
+      <p:par>
+        <p:cTn id="1" dur="indefinite" restart="never" nodeType="tmRoot"/>
+      </p:par>
+    </p:tnLst>
+  </p:timing>
+</p:sld>
+</file>
+
+<file path=ppt/slides/slide7.xml><?xml version="1.0" encoding="utf-8"?>
+<p:sld xmlns:a="http://schemas.openxmlformats.org/drawingml/2006/main" xmlns:r="http://schemas.openxmlformats.org/officeDocument/2006/relationships" xmlns:p="http://schemas.openxmlformats.org/presentationml/2006/main">
+  <p:cSld>
+    <p:spTree>
+      <p:nvGrpSpPr>
+        <p:cNvPr id="1" name=""/>
+        <p:cNvGrpSpPr/>
+        <p:nvPr/>
+      </p:nvGrpSpPr>
+      <p:grpSpPr>
+        <a:xfrm>
+          <a:off x="0" y="0"/>
+          <a:ext cx="0" cy="0"/>
+          <a:chOff x="0" y="0"/>
+          <a:chExt cx="0" cy="0"/>
+        </a:xfrm>
+      </p:grpSpPr>
+      <p:sp>
+        <p:nvSpPr>
+          <p:cNvPr id="2" name="Title 1"/>
+          <p:cNvSpPr>
+            <a:spLocks noGrp="1"/>
+          </p:cNvSpPr>
+          <p:nvPr>
+            <p:ph type="title"/>
+          </p:nvPr>
+        </p:nvSpPr>
+        <p:spPr/>
+        <p:txBody>
+          <a:bodyPr/>
+          <a:lstStyle/>
+          <a:p>
+            <a:r>
+              <a:rPr lang="en-US" dirty="0" smtClean="0"/>
+              <a:t>Example</a:t>
+            </a:r>
+            <a:endParaRPr lang="en-US" dirty="0"/>
+          </a:p>
+        </p:txBody>
+      </p:sp>
+      <p:sp>
+        <p:nvSpPr>
+          <p:cNvPr id="3" name="Content Placeholder 2"/>
+          <p:cNvSpPr>
+            <a:spLocks noGrp="1"/>
+          </p:cNvSpPr>
+          <p:nvPr>
+            <p:ph idx="1"/>
+          </p:nvPr>
+        </p:nvSpPr>
+        <p:spPr/>
+        <p:txBody>
+          <a:bodyPr/>
+          <a:lstStyle/>
+          <a:p>
+            <a:r>
+              <a:rPr lang="en-US" dirty="0" smtClean="0"/>
+              <a:t>Let’s create a producer/consumer queue that is safe to use from multiple threads</a:t>
+            </a:r>
+            <a:endParaRPr lang="en-US" dirty="0"/>
+          </a:p>
+        </p:txBody>
+      </p:sp>
+      <p:sp>
+        <p:nvSpPr>
+          <p:cNvPr id="4" name="Slide Number Placeholder 3"/>
+          <p:cNvSpPr>
+            <a:spLocks noGrp="1"/>
+          </p:cNvSpPr>
+          <p:nvPr>
+            <p:ph type="sldNum" sz="quarter" idx="12"/>
+          </p:nvPr>
+        </p:nvSpPr>
+        <p:spPr/>
+        <p:txBody>
+          <a:bodyPr/>
+          <a:lstStyle/>
+          <a:p>
+            <a:fld id="{6DA12B36-9664-4CB0-8B2E-F4A2F44AE97E}" type="slidenum">
+              <a:rPr lang="en-US" smtClean="0"/>
+              <a:t>7</a:t>
+            </a:fld>
+            <a:endParaRPr lang="en-US"/>
+          </a:p>
+        </p:txBody>
+      </p:sp>
+    </p:spTree>
+    <p:extLst>
+      <p:ext uri="{BB962C8B-B14F-4D97-AF65-F5344CB8AC3E}">
+        <p14:creationId xmlns:p14="http://schemas.microsoft.com/office/powerpoint/2010/main" val="835744730"/>
+      </p:ext>
+    </p:extLst>
+  </p:cSld>
+  <p:clrMapOvr>
+    <a:masterClrMapping/>
+  </p:clrMapOvr>
+</p:sld>
+</file>
+
+<file path=ppt/slides/slide8.xml><?xml version="1.0" encoding="utf-8"?>
+<p:sld xmlns:a="http://schemas.openxmlformats.org/drawingml/2006/main" xmlns:r="http://schemas.openxmlformats.org/officeDocument/2006/relationships" xmlns:p="http://schemas.openxmlformats.org/presentationml/2006/main">
+  <p:cSld>
+    <p:spTree>
+      <p:nvGrpSpPr>
+        <p:cNvPr id="1" name=""/>
+        <p:cNvGrpSpPr/>
+        <p:nvPr/>
+      </p:nvGrpSpPr>
+      <p:grpSpPr>
+        <a:xfrm>
+          <a:off x="0" y="0"/>
+          <a:ext cx="0" cy="0"/>
+          <a:chOff x="0" y="0"/>
+          <a:chExt cx="0" cy="0"/>
+        </a:xfrm>
+      </p:grpSpPr>
+      <p:sp>
+        <p:nvSpPr>
+          <p:cNvPr id="2" name="Title 1"/>
+          <p:cNvSpPr>
+            <a:spLocks noGrp="1"/>
+          </p:cNvSpPr>
+          <p:nvPr>
+            <p:ph type="title"/>
+          </p:nvPr>
+        </p:nvSpPr>
+        <p:spPr/>
+        <p:txBody>
+          <a:bodyPr/>
+          <a:lstStyle/>
+          <a:p>
+            <a:r>
+              <a:rPr lang="en-US" dirty="0" smtClean="0"/>
+              <a:t>deadlocks</a:t>
+            </a:r>
+            <a:endParaRPr lang="en-US" dirty="0"/>
+          </a:p>
+        </p:txBody>
+      </p:sp>
+      <p:sp>
+        <p:nvSpPr>
+          <p:cNvPr id="3" name="Content Placeholder 2"/>
+          <p:cNvSpPr>
+            <a:spLocks noGrp="1"/>
+          </p:cNvSpPr>
+          <p:nvPr>
+            <p:ph idx="1"/>
+          </p:nvPr>
+        </p:nvSpPr>
+        <p:spPr/>
+        <p:txBody>
+          <a:bodyPr/>
+          <a:lstStyle/>
+          <a:p>
+            <a:r>
+              <a:rPr lang="en-US" dirty="0" smtClean="0"/>
+              <a:t>A deadlock occurs when</a:t>
+            </a:r>
+          </a:p>
+          <a:p>
+            <a:pPr marL="800100" lvl="1" indent="-342900"/>
+            <a:r>
+              <a:rPr lang="en-US" dirty="0" smtClean="0"/>
+              <a:t>One thread takes a lock</a:t>
+            </a:r>
+          </a:p>
+          <a:p>
+            <a:pPr marL="800100" lvl="1" indent="-342900"/>
+            <a:r>
+              <a:rPr lang="en-US" dirty="0" smtClean="0"/>
+              <a:t>The thread with the lock waits for another thread</a:t>
+            </a:r>
+          </a:p>
+          <a:p>
+            <a:pPr marL="800100" lvl="1" indent="-342900"/>
+            <a:r>
+              <a:rPr lang="en-US" dirty="0" smtClean="0"/>
+              <a:t>The second thread waits for the first thread</a:t>
+            </a:r>
+          </a:p>
+          <a:p>
+            <a:pPr marL="342900" indent="-342900"/>
+            <a:r>
+              <a:rPr lang="en-US" dirty="0" smtClean="0"/>
+              <a:t>A deadlock requires</a:t>
+            </a:r>
+          </a:p>
+          <a:p>
+            <a:pPr marL="800100" lvl="1" indent="-342900"/>
+            <a:r>
+              <a:rPr lang="en-US" dirty="0" smtClean="0"/>
+              <a:t>Two </a:t>
+            </a:r>
+            <a:r>
+              <a:rPr lang="en-US" i="1" dirty="0" smtClean="0"/>
+              <a:t>different</a:t>
+            </a:r>
+            <a:r>
+              <a:rPr lang="en-US" dirty="0" smtClean="0"/>
+              <a:t> mutexes</a:t>
+            </a:r>
+          </a:p>
+          <a:p>
+            <a:pPr marL="800100" lvl="1" indent="-342900"/>
+            <a:r>
+              <a:rPr lang="en-US" dirty="0" smtClean="0"/>
+              <a:t>Two threads</a:t>
+            </a:r>
+          </a:p>
+          <a:p>
+            <a:pPr marL="342900" indent="-342900"/>
+            <a:r>
+              <a:rPr lang="en-US" dirty="0" smtClean="0"/>
+              <a:t>Let’s take a look at an example of </a:t>
+            </a:r>
+            <a:r>
+              <a:rPr lang="en-US" smtClean="0"/>
+              <a:t>a deadlock</a:t>
+            </a:r>
+            <a:endParaRPr lang="en-US" dirty="0"/>
+          </a:p>
+        </p:txBody>
+      </p:sp>
+      <p:sp>
+        <p:nvSpPr>
+          <p:cNvPr id="4" name="Slide Number Placeholder 3"/>
+          <p:cNvSpPr>
+            <a:spLocks noGrp="1"/>
+          </p:cNvSpPr>
+          <p:nvPr>
+            <p:ph type="sldNum" sz="quarter" idx="12"/>
+          </p:nvPr>
+        </p:nvSpPr>
+        <p:spPr/>
+        <p:txBody>
+          <a:bodyPr/>
+          <a:lstStyle/>
+          <a:p>
+            <a:fld id="{6DA12B36-9664-4CB0-8B2E-F4A2F44AE97E}" type="slidenum">
+              <a:rPr lang="en-US" smtClean="0"/>
+              <a:t>8</a:t>
+            </a:fld>
+            <a:endParaRPr lang="en-US"/>
+          </a:p>
+        </p:txBody>
+      </p:sp>
+    </p:spTree>
+    <p:extLst>
+      <p:ext uri="{BB962C8B-B14F-4D97-AF65-F5344CB8AC3E}">
+        <p14:creationId xmlns:p14="http://schemas.microsoft.com/office/powerpoint/2010/main" val="767640964"/>
       </p:ext>
     </p:extLst>
   </p:cSld>

</xml_diff>

<commit_message>
More updates the Mutexes lecture.
</commit_message>
<xml_diff>
--- a/Lectures/Mutexes/Mutexes.pptx
+++ b/Lectures/Mutexes/Mutexes.pptx
@@ -5,7 +5,7 @@
     <p:sldMasterId id="2147483660" r:id="rId1"/>
   </p:sldMasterIdLst>
   <p:notesMasterIdLst>
-    <p:notesMasterId r:id="rId10"/>
+    <p:notesMasterId r:id="rId11"/>
   </p:notesMasterIdLst>
   <p:sldIdLst>
     <p:sldId id="256" r:id="rId2"/>
@@ -16,6 +16,7 @@
     <p:sldId id="261" r:id="rId7"/>
     <p:sldId id="262" r:id="rId8"/>
     <p:sldId id="263" r:id="rId9"/>
+    <p:sldId id="264" r:id="rId10"/>
   </p:sldIdLst>
   <p:sldSz cx="9144000" cy="6858000" type="screen4x3"/>
   <p:notesSz cx="6858000" cy="9144000"/>
@@ -4944,7 +4945,46 @@
               <a:rPr lang="en-US" dirty="0" smtClean="0"/>
               <a:t>Let’s create a producer/consumer queue that is safe to use from multiple threads</a:t>
             </a:r>
+          </a:p>
+          <a:p>
             <a:endParaRPr lang="en-US" dirty="0"/>
+          </a:p>
+          <a:p>
+            <a:r>
+              <a:rPr lang="en-US" dirty="0" smtClean="0">
+                <a:solidFill>
+                  <a:schemeClr val="accent3"/>
+                </a:solidFill>
+              </a:rPr>
+              <a:t>Guidelines:</a:t>
+            </a:r>
+          </a:p>
+          <a:p>
+            <a:pPr marL="800100" lvl="1" indent="-342900"/>
+            <a:r>
+              <a:rPr lang="en-US" dirty="0" smtClean="0">
+                <a:solidFill>
+                  <a:schemeClr val="accent3"/>
+                </a:solidFill>
+              </a:rPr>
+              <a:t>Lock at the highest level possible for correctness, profile for performance improvement</a:t>
+            </a:r>
+          </a:p>
+          <a:p>
+            <a:pPr marL="800100" lvl="1" indent="-342900"/>
+            <a:r>
+              <a:rPr lang="en-US" dirty="0" smtClean="0">
+                <a:solidFill>
+                  <a:schemeClr val="accent3"/>
+                </a:solidFill>
+              </a:rPr>
+              <a:t>Do not expose an interface that let’s clients get into trouble</a:t>
+            </a:r>
+            <a:endParaRPr lang="en-US" dirty="0">
+              <a:solidFill>
+                <a:schemeClr val="accent3"/>
+              </a:solidFill>
+            </a:endParaRPr>
           </a:p>
         </p:txBody>
       </p:sp>
@@ -4981,6 +5021,147 @@
   <p:clrMapOvr>
     <a:masterClrMapping/>
   </p:clrMapOvr>
+  <p:timing>
+    <p:tnLst>
+      <p:par>
+        <p:cTn id="1" dur="indefinite" restart="never" nodeType="tmRoot">
+          <p:childTnLst>
+            <p:seq concurrent="1" nextAc="seek">
+              <p:cTn id="2" dur="indefinite" nodeType="mainSeq">
+                <p:childTnLst>
+                  <p:par>
+                    <p:cTn id="3" fill="hold">
+                      <p:stCondLst>
+                        <p:cond delay="indefinite"/>
+                      </p:stCondLst>
+                      <p:childTnLst>
+                        <p:par>
+                          <p:cTn id="4" fill="hold">
+                            <p:stCondLst>
+                              <p:cond delay="0"/>
+                            </p:stCondLst>
+                            <p:childTnLst>
+                              <p:par>
+                                <p:cTn id="5" presetID="1" presetClass="entr" presetSubtype="0" fill="hold" nodeType="clickEffect">
+                                  <p:stCondLst>
+                                    <p:cond delay="0"/>
+                                  </p:stCondLst>
+                                  <p:childTnLst>
+                                    <p:set>
+                                      <p:cBhvr>
+                                        <p:cTn id="6" dur="1" fill="hold">
+                                          <p:stCondLst>
+                                            <p:cond delay="0"/>
+                                          </p:stCondLst>
+                                        </p:cTn>
+                                        <p:tgtEl>
+                                          <p:spTgt spid="3">
+                                            <p:txEl>
+                                              <p:pRg st="2" end="2"/>
+                                            </p:txEl>
+                                          </p:spTgt>
+                                        </p:tgtEl>
+                                        <p:attrNameLst>
+                                          <p:attrName>style.visibility</p:attrName>
+                                        </p:attrNameLst>
+                                      </p:cBhvr>
+                                      <p:to>
+                                        <p:strVal val="visible"/>
+                                      </p:to>
+                                    </p:set>
+                                  </p:childTnLst>
+                                </p:cTn>
+                              </p:par>
+                              <p:par>
+                                <p:cTn id="7" presetID="1" presetClass="entr" presetSubtype="0" fill="hold" nodeType="withEffect">
+                                  <p:stCondLst>
+                                    <p:cond delay="0"/>
+                                  </p:stCondLst>
+                                  <p:childTnLst>
+                                    <p:set>
+                                      <p:cBhvr>
+                                        <p:cTn id="8" dur="1" fill="hold">
+                                          <p:stCondLst>
+                                            <p:cond delay="0"/>
+                                          </p:stCondLst>
+                                        </p:cTn>
+                                        <p:tgtEl>
+                                          <p:spTgt spid="3">
+                                            <p:txEl>
+                                              <p:pRg st="3" end="3"/>
+                                            </p:txEl>
+                                          </p:spTgt>
+                                        </p:tgtEl>
+                                        <p:attrNameLst>
+                                          <p:attrName>style.visibility</p:attrName>
+                                        </p:attrNameLst>
+                                      </p:cBhvr>
+                                      <p:to>
+                                        <p:strVal val="visible"/>
+                                      </p:to>
+                                    </p:set>
+                                  </p:childTnLst>
+                                </p:cTn>
+                              </p:par>
+                              <p:par>
+                                <p:cTn id="9" presetID="1" presetClass="entr" presetSubtype="0" fill="hold" nodeType="withEffect">
+                                  <p:stCondLst>
+                                    <p:cond delay="0"/>
+                                  </p:stCondLst>
+                                  <p:childTnLst>
+                                    <p:set>
+                                      <p:cBhvr>
+                                        <p:cTn id="10" dur="1" fill="hold">
+                                          <p:stCondLst>
+                                            <p:cond delay="0"/>
+                                          </p:stCondLst>
+                                        </p:cTn>
+                                        <p:tgtEl>
+                                          <p:spTgt spid="3">
+                                            <p:txEl>
+                                              <p:pRg st="4" end="4"/>
+                                            </p:txEl>
+                                          </p:spTgt>
+                                        </p:tgtEl>
+                                        <p:attrNameLst>
+                                          <p:attrName>style.visibility</p:attrName>
+                                        </p:attrNameLst>
+                                      </p:cBhvr>
+                                      <p:to>
+                                        <p:strVal val="visible"/>
+                                      </p:to>
+                                    </p:set>
+                                  </p:childTnLst>
+                                </p:cTn>
+                              </p:par>
+                            </p:childTnLst>
+                          </p:cTn>
+                        </p:par>
+                      </p:childTnLst>
+                    </p:cTn>
+                  </p:par>
+                </p:childTnLst>
+              </p:cTn>
+              <p:prevCondLst>
+                <p:cond evt="onPrev" delay="0">
+                  <p:tgtEl>
+                    <p:sldTgt/>
+                  </p:tgtEl>
+                </p:cond>
+              </p:prevCondLst>
+              <p:nextCondLst>
+                <p:cond evt="onNext" delay="0">
+                  <p:tgtEl>
+                    <p:sldTgt/>
+                  </p:tgtEl>
+                </p:cond>
+              </p:nextCondLst>
+            </p:seq>
+          </p:childTnLst>
+        </p:cTn>
+      </p:par>
+    </p:tnLst>
+  </p:timing>
 </p:sld>
 </file>
 
@@ -5095,14 +5276,17 @@
             </a:r>
           </a:p>
           <a:p>
+            <a:pPr marL="800100" lvl="1" indent="-342900"/>
+            <a:r>
+              <a:rPr lang="en-US" dirty="0" smtClean="0"/>
+              <a:t>The two mutexes are locked in different orders</a:t>
+            </a:r>
+          </a:p>
+          <a:p>
             <a:pPr marL="342900" indent="-342900"/>
             <a:r>
               <a:rPr lang="en-US" dirty="0" smtClean="0"/>
-              <a:t>Let’s take a look at an example of </a:t>
-            </a:r>
-            <a:r>
-              <a:rPr lang="en-US" smtClean="0"/>
-              <a:t>a deadlock</a:t>
+              <a:t>Let’s take a look at an example of a deadlock</a:t>
             </a:r>
             <a:endParaRPr lang="en-US" dirty="0"/>
           </a:p>
@@ -5141,6 +5325,196 @@
   <p:clrMapOvr>
     <a:masterClrMapping/>
   </p:clrMapOvr>
+  <p:timing>
+    <p:tnLst>
+      <p:par>
+        <p:cTn id="1" dur="indefinite" restart="never" nodeType="tmRoot"/>
+      </p:par>
+    </p:tnLst>
+  </p:timing>
+</p:sld>
+</file>
+
+<file path=ppt/slides/slide9.xml><?xml version="1.0" encoding="utf-8"?>
+<p:sld xmlns:a="http://schemas.openxmlformats.org/drawingml/2006/main" xmlns:r="http://schemas.openxmlformats.org/officeDocument/2006/relationships" xmlns:p="http://schemas.openxmlformats.org/presentationml/2006/main">
+  <p:cSld>
+    <p:spTree>
+      <p:nvGrpSpPr>
+        <p:cNvPr id="1" name=""/>
+        <p:cNvGrpSpPr/>
+        <p:nvPr/>
+      </p:nvGrpSpPr>
+      <p:grpSpPr>
+        <a:xfrm>
+          <a:off x="0" y="0"/>
+          <a:ext cx="0" cy="0"/>
+          <a:chOff x="0" y="0"/>
+          <a:chExt cx="0" cy="0"/>
+        </a:xfrm>
+      </p:grpSpPr>
+      <p:sp>
+        <p:nvSpPr>
+          <p:cNvPr id="2" name="Title 1"/>
+          <p:cNvSpPr>
+            <a:spLocks noGrp="1"/>
+          </p:cNvSpPr>
+          <p:nvPr>
+            <p:ph type="title"/>
+          </p:nvPr>
+        </p:nvSpPr>
+        <p:spPr/>
+        <p:txBody>
+          <a:bodyPr/>
+          <a:lstStyle/>
+          <a:p>
+            <a:r>
+              <a:rPr lang="en-US" dirty="0" smtClean="0"/>
+              <a:t>Avoiding deadlocks</a:t>
+            </a:r>
+            <a:endParaRPr lang="en-US" dirty="0"/>
+          </a:p>
+        </p:txBody>
+      </p:sp>
+      <p:sp>
+        <p:nvSpPr>
+          <p:cNvPr id="3" name="Content Placeholder 2"/>
+          <p:cNvSpPr>
+            <a:spLocks noGrp="1"/>
+          </p:cNvSpPr>
+          <p:nvPr>
+            <p:ph idx="1"/>
+          </p:nvPr>
+        </p:nvSpPr>
+        <p:spPr/>
+        <p:txBody>
+          <a:bodyPr/>
+          <a:lstStyle/>
+          <a:p>
+            <a:r>
+              <a:rPr lang="en-US" dirty="0" smtClean="0"/>
+              <a:t>Deadlocks can be avoided by following some rules</a:t>
+            </a:r>
+          </a:p>
+          <a:p>
+            <a:r>
+              <a:rPr lang="en-US" dirty="0" smtClean="0">
+                <a:solidFill>
+                  <a:schemeClr val="accent3"/>
+                </a:solidFill>
+              </a:rPr>
+              <a:t>Guidelines:</a:t>
+            </a:r>
+          </a:p>
+          <a:p>
+            <a:pPr marL="800100" lvl="1" indent="-342900"/>
+            <a:r>
+              <a:rPr lang="en-US" dirty="0" smtClean="0">
+                <a:solidFill>
+                  <a:schemeClr val="accent3"/>
+                </a:solidFill>
+              </a:rPr>
+              <a:t>Avoid nested locks - do not acquire another lock if your already have one</a:t>
+            </a:r>
+          </a:p>
+          <a:p>
+            <a:pPr marL="800100" lvl="1" indent="-342900"/>
+            <a:r>
+              <a:rPr lang="en-US" dirty="0" smtClean="0">
+                <a:solidFill>
+                  <a:schemeClr val="accent3"/>
+                </a:solidFill>
+              </a:rPr>
+              <a:t>Avoid calling user-supplied code while holding a lock</a:t>
+            </a:r>
+          </a:p>
+          <a:p>
+            <a:pPr marL="800100" lvl="1" indent="-342900"/>
+            <a:r>
+              <a:rPr lang="en-US" dirty="0" smtClean="0">
+                <a:solidFill>
+                  <a:schemeClr val="accent3"/>
+                </a:solidFill>
+              </a:rPr>
+              <a:t>Acquire locks in a fixed order – always (a lock hierarchy can help)</a:t>
+            </a:r>
+          </a:p>
+          <a:p>
+            <a:pPr marL="800100" lvl="1" indent="-342900"/>
+            <a:endParaRPr lang="en-US" dirty="0" smtClean="0"/>
+          </a:p>
+          <a:p>
+            <a:pPr marL="800100" lvl="1" indent="-342900"/>
+            <a:endParaRPr lang="en-US" dirty="0" smtClean="0"/>
+          </a:p>
+          <a:p>
+            <a:pPr marL="800100" lvl="1" indent="-342900"/>
+            <a:endParaRPr lang="en-US" dirty="0"/>
+          </a:p>
+        </p:txBody>
+      </p:sp>
+      <p:sp>
+        <p:nvSpPr>
+          <p:cNvPr id="4" name="Slide Number Placeholder 3"/>
+          <p:cNvSpPr>
+            <a:spLocks noGrp="1"/>
+          </p:cNvSpPr>
+          <p:nvPr>
+            <p:ph type="sldNum" sz="quarter" idx="12"/>
+          </p:nvPr>
+        </p:nvSpPr>
+        <p:spPr/>
+        <p:txBody>
+          <a:bodyPr/>
+          <a:lstStyle/>
+          <a:p>
+            <a:fld id="{6DA12B36-9664-4CB0-8B2E-F4A2F44AE97E}" type="slidenum">
+              <a:rPr lang="en-US" smtClean="0"/>
+              <a:t>9</a:t>
+            </a:fld>
+            <a:endParaRPr lang="en-US"/>
+          </a:p>
+        </p:txBody>
+      </p:sp>
+      <p:sp>
+        <p:nvSpPr>
+          <p:cNvPr id="5" name="Footer Placeholder 4"/>
+          <p:cNvSpPr>
+            <a:spLocks noGrp="1"/>
+          </p:cNvSpPr>
+          <p:nvPr>
+            <p:ph type="ftr" sz="quarter" idx="11"/>
+          </p:nvPr>
+        </p:nvSpPr>
+        <p:spPr/>
+        <p:txBody>
+          <a:bodyPr/>
+          <a:lstStyle/>
+          <a:p>
+            <a:r>
+              <a:rPr lang="en-US" smtClean="0"/>
+              <a:t>Source: Williams, Chapter 3</a:t>
+            </a:r>
+            <a:endParaRPr lang="en-US"/>
+          </a:p>
+        </p:txBody>
+      </p:sp>
+    </p:spTree>
+    <p:extLst>
+      <p:ext uri="{BB962C8B-B14F-4D97-AF65-F5344CB8AC3E}">
+        <p14:creationId xmlns:p14="http://schemas.microsoft.com/office/powerpoint/2010/main" val="978149292"/>
+      </p:ext>
+    </p:extLst>
+  </p:cSld>
+  <p:clrMapOvr>
+    <a:masterClrMapping/>
+  </p:clrMapOvr>
+  <p:timing>
+    <p:tnLst>
+      <p:par>
+        <p:cTn id="1" dur="indefinite" restart="never" nodeType="tmRoot"/>
+      </p:par>
+    </p:tnLst>
+  </p:timing>
 </p:sld>
 </file>
 

</xml_diff>

<commit_message>
Add some information about std::unique_lock.
</commit_message>
<xml_diff>
--- a/Lectures/Mutexes/Mutexes.pptx
+++ b/Lectures/Mutexes/Mutexes.pptx
@@ -201,7 +201,7 @@
           <a:p>
             <a:fld id="{DBE0ECA1-3FBF-48AE-AD2A-4439AE745E19}" type="datetimeFigureOut">
               <a:rPr lang="en-US" smtClean="0"/>
-              <a:t>11/11/2013</a:t>
+              <a:t>11/12/2013</a:t>
             </a:fld>
             <a:endParaRPr lang="en-US"/>
           </a:p>
@@ -662,7 +662,7 @@
           <a:p>
             <a:fld id="{9769DED8-28D4-45B9-A00F-7CFE9335FEA6}" type="datetime1">
               <a:rPr lang="en-US" smtClean="0"/>
-              <a:t>11/11/2013</a:t>
+              <a:t>11/12/2013</a:t>
             </a:fld>
             <a:endParaRPr lang="en-US"/>
           </a:p>
@@ -927,7 +927,7 @@
           <a:p>
             <a:fld id="{2DB3D439-1F88-44B4-B5F7-F9BCD4064257}" type="datetime1">
               <a:rPr lang="en-US" smtClean="0"/>
-              <a:t>11/11/2013</a:t>
+              <a:t>11/12/2013</a:t>
             </a:fld>
             <a:endParaRPr lang="en-US"/>
           </a:p>
@@ -1102,7 +1102,7 @@
           <a:p>
             <a:fld id="{99C5638F-6F55-4055-935C-67841BE78C36}" type="datetime1">
               <a:rPr lang="en-US" smtClean="0"/>
-              <a:t>11/11/2013</a:t>
+              <a:t>11/12/2013</a:t>
             </a:fld>
             <a:endParaRPr lang="en-US"/>
           </a:p>
@@ -1267,7 +1267,7 @@
           <a:p>
             <a:fld id="{E6987D90-0C92-4B22-A29D-FED15412CED2}" type="datetime1">
               <a:rPr lang="en-US" smtClean="0"/>
-              <a:t>11/11/2013</a:t>
+              <a:t>11/12/2013</a:t>
             </a:fld>
             <a:endParaRPr lang="en-US"/>
           </a:p>
@@ -1516,7 +1516,7 @@
           <a:p>
             <a:fld id="{DDB67BC4-9554-49E0-BCB3-D1EF965BA0B8}" type="datetime1">
               <a:rPr lang="en-US" smtClean="0"/>
-              <a:t>11/11/2013</a:t>
+              <a:t>11/12/2013</a:t>
             </a:fld>
             <a:endParaRPr lang="en-US"/>
           </a:p>
@@ -1799,7 +1799,7 @@
           <a:p>
             <a:fld id="{EC24D770-803D-4E01-921C-9C100DD8230C}" type="datetime1">
               <a:rPr lang="en-US" smtClean="0"/>
-              <a:t>11/11/2013</a:t>
+              <a:t>11/12/2013</a:t>
             </a:fld>
             <a:endParaRPr lang="en-US"/>
           </a:p>
@@ -2238,7 +2238,7 @@
           <a:p>
             <a:fld id="{356AD44B-78A4-4209-8070-7DCBE2DC4992}" type="datetime1">
               <a:rPr lang="en-US" smtClean="0"/>
-              <a:t>11/11/2013</a:t>
+              <a:t>11/12/2013</a:t>
             </a:fld>
             <a:endParaRPr lang="en-US"/>
           </a:p>
@@ -2351,7 +2351,7 @@
           <a:p>
             <a:fld id="{A993C59A-7CA2-467F-B7F1-9096881A01B8}" type="datetime1">
               <a:rPr lang="en-US" smtClean="0"/>
-              <a:t>11/11/2013</a:t>
+              <a:t>11/12/2013</a:t>
             </a:fld>
             <a:endParaRPr lang="en-US"/>
           </a:p>
@@ -2441,7 +2441,7 @@
           <a:p>
             <a:fld id="{2B6B58D0-2488-434A-8ED1-692E09B85CC5}" type="datetime1">
               <a:rPr lang="en-US" smtClean="0"/>
-              <a:t>11/11/2013</a:t>
+              <a:t>11/12/2013</a:t>
             </a:fld>
             <a:endParaRPr lang="en-US"/>
           </a:p>
@@ -2683,7 +2683,7 @@
           <a:p>
             <a:fld id="{FDB0AFC2-7D64-4F61-A7B7-9932D3305DDA}" type="datetime1">
               <a:rPr lang="en-US" smtClean="0"/>
-              <a:t>11/11/2013</a:t>
+              <a:t>11/12/2013</a:t>
             </a:fld>
             <a:endParaRPr lang="en-US"/>
           </a:p>
@@ -2977,7 +2977,7 @@
           <a:p>
             <a:fld id="{4983D17A-D7B2-4ECE-8A2C-93679B9D177B}" type="datetime1">
               <a:rPr lang="en-US" smtClean="0"/>
-              <a:t>11/11/2013</a:t>
+              <a:t>11/12/2013</a:t>
             </a:fld>
             <a:endParaRPr lang="en-US"/>
           </a:p>
@@ -3271,7 +3271,7 @@
           <a:p>
             <a:fld id="{2A5275F7-419E-4C23-8A3D-2EE5742B2EC9}" type="datetime1">
               <a:rPr lang="en-US" smtClean="0"/>
-              <a:t>11/11/2013</a:t>
+              <a:t>11/12/2013</a:t>
             </a:fld>
             <a:endParaRPr lang="en-US"/>
           </a:p>
@@ -3998,7 +3998,7 @@
                   <a:schemeClr val="accent3"/>
                 </a:solidFill>
               </a:rPr>
-              <a:t> with each </a:t>
+              <a:t> or </a:t>
             </a:r>
             <a:r>
               <a:rPr lang="en-US" dirty="0" err="1">
@@ -4021,25 +4021,61 @@
               <a:t>::</a:t>
             </a:r>
             <a:r>
-              <a:rPr lang="en-US" dirty="0" smtClean="0">
+              <a:rPr lang="en-US" dirty="0" err="1">
                 <a:solidFill>
                   <a:schemeClr val="accent3"/>
                 </a:solidFill>
                 <a:latin typeface="Courier New" panose="02070309020205020404" pitchFamily="49" charset="0"/>
                 <a:cs typeface="Courier New" panose="02070309020205020404" pitchFamily="49" charset="0"/>
               </a:rPr>
-              <a:t>mutex</a:t>
+              <a:t>unique_lock</a:t>
+            </a:r>
+            <a:r>
+              <a:rPr lang="en-US" dirty="0">
+                <a:solidFill>
+                  <a:schemeClr val="accent3"/>
+                </a:solidFill>
+              </a:rPr>
+              <a:t> with each </a:t>
+            </a:r>
+            <a:r>
+              <a:rPr lang="en-US" dirty="0" err="1">
+                <a:solidFill>
+                  <a:schemeClr val="accent3"/>
+                </a:solidFill>
+                <a:latin typeface="Courier New" panose="02070309020205020404" pitchFamily="49" charset="0"/>
+                <a:cs typeface="Courier New" panose="02070309020205020404" pitchFamily="49" charset="0"/>
+              </a:rPr>
+              <a:t>std</a:t>
+            </a:r>
+            <a:r>
+              <a:rPr lang="en-US" dirty="0">
+                <a:solidFill>
+                  <a:schemeClr val="accent3"/>
+                </a:solidFill>
+                <a:latin typeface="Courier New" panose="02070309020205020404" pitchFamily="49" charset="0"/>
+                <a:cs typeface="Courier New" panose="02070309020205020404" pitchFamily="49" charset="0"/>
+              </a:rPr>
+              <a:t>::mutex</a:t>
             </a:r>
           </a:p>
           <a:p>
             <a:pPr marL="800100" lvl="1" indent="-342900"/>
             <a:r>
+              <a:rPr lang="en-US" dirty="0" smtClean="0">
+                <a:solidFill>
+                  <a:schemeClr val="accent3"/>
+                </a:solidFill>
+              </a:rPr>
+              <a:t>Avoid </a:t>
+            </a:r>
+            <a:r>
               <a:rPr lang="en-US" dirty="0">
                 <a:solidFill>
                   <a:schemeClr val="accent3"/>
                 </a:solidFill>
               </a:rPr>
-              <a:t>Avoid nested locks - do not acquire another lock if your already have one</a:t>
+              <a:t>nested locks - do not acquire another lock if your already have one</a:t>
             </a:r>
           </a:p>
           <a:p>
@@ -4915,7 +4951,9 @@
         </p:nvSpPr>
         <p:spPr/>
         <p:txBody>
-          <a:bodyPr/>
+          <a:bodyPr>
+            <a:normAutofit fontScale="92500" lnSpcReduction="10000"/>
+          </a:bodyPr>
           <a:lstStyle/>
           <a:p>
             <a:r>
@@ -4942,34 +4980,24 @@
             <a:pPr marL="800100" lvl="1" indent="-342900"/>
             <a:r>
               <a:rPr lang="en-US" dirty="0" smtClean="0"/>
-              <a:t>A new return statement will prevent the mutex from being unlocked</a:t>
-            </a:r>
-          </a:p>
-          <a:p>
-            <a:r>
-              <a:rPr lang="en-US" dirty="0" smtClean="0">
-                <a:solidFill>
-                  <a:schemeClr val="accent3"/>
-                </a:solidFill>
-              </a:rPr>
-              <a:t>Guidelines: </a:t>
+              <a:t>A new return statement will prevent the mutex from being </a:t>
+            </a:r>
+            <a:r>
+              <a:rPr lang="en-US" dirty="0" smtClean="0"/>
+              <a:t>unlocked</a:t>
             </a:r>
           </a:p>
           <a:p>
             <a:pPr marL="800100" lvl="1" indent="-342900"/>
             <a:r>
-              <a:rPr lang="en-US" dirty="0" smtClean="0">
-                <a:solidFill>
-                  <a:schemeClr val="accent3"/>
-                </a:solidFill>
-              </a:rPr>
-              <a:t>Don’t call lock or unlock on a </a:t>
-            </a:r>
+              <a:rPr lang="en-US" dirty="0" smtClean="0"/>
+              <a:t>Two options</a:t>
+            </a:r>
+          </a:p>
+          <a:p>
+            <a:pPr marL="1485900" lvl="2" indent="-342900"/>
             <a:r>
               <a:rPr lang="en-US" dirty="0" err="1" smtClean="0">
-                <a:solidFill>
-                  <a:schemeClr val="accent3"/>
-                </a:solidFill>
                 <a:latin typeface="Courier New" panose="02070309020205020404" pitchFamily="49" charset="0"/>
                 <a:cs typeface="Courier New" panose="02070309020205020404" pitchFamily="49" charset="0"/>
               </a:rPr>
@@ -4977,6 +5005,105 @@
             </a:r>
             <a:r>
               <a:rPr lang="en-US" dirty="0" smtClean="0">
+                <a:latin typeface="Courier New" panose="02070309020205020404" pitchFamily="49" charset="0"/>
+                <a:cs typeface="Courier New" panose="02070309020205020404" pitchFamily="49" charset="0"/>
+              </a:rPr>
+              <a:t>::</a:t>
+            </a:r>
+            <a:r>
+              <a:rPr lang="en-US" dirty="0" err="1" smtClean="0">
+                <a:latin typeface="Courier New" panose="02070309020205020404" pitchFamily="49" charset="0"/>
+                <a:cs typeface="Courier New" panose="02070309020205020404" pitchFamily="49" charset="0"/>
+              </a:rPr>
+              <a:t>lock_guard</a:t>
+            </a:r>
+            <a:r>
+              <a:rPr lang="en-US" dirty="0" smtClean="0">
+                <a:latin typeface="Courier New" panose="02070309020205020404" pitchFamily="49" charset="0"/>
+                <a:cs typeface="Courier New" panose="02070309020205020404" pitchFamily="49" charset="0"/>
+              </a:rPr>
+              <a:t> </a:t>
+            </a:r>
+            <a:r>
+              <a:rPr lang="en-US" dirty="0" smtClean="0"/>
+              <a:t>– always owns a mutex</a:t>
+            </a:r>
+          </a:p>
+          <a:p>
+            <a:pPr marL="1485900" lvl="2" indent="-342900"/>
+            <a:r>
+              <a:rPr lang="en-US" dirty="0" err="1">
+                <a:latin typeface="Courier New" panose="02070309020205020404" pitchFamily="49" charset="0"/>
+                <a:cs typeface="Courier New" panose="02070309020205020404" pitchFamily="49" charset="0"/>
+              </a:rPr>
+              <a:t>s</a:t>
+            </a:r>
+            <a:r>
+              <a:rPr lang="en-US" dirty="0" err="1" smtClean="0">
+                <a:latin typeface="Courier New" panose="02070309020205020404" pitchFamily="49" charset="0"/>
+                <a:cs typeface="Courier New" panose="02070309020205020404" pitchFamily="49" charset="0"/>
+              </a:rPr>
+              <a:t>td</a:t>
+            </a:r>
+            <a:r>
+              <a:rPr lang="en-US" dirty="0" smtClean="0">
+                <a:latin typeface="Courier New" panose="02070309020205020404" pitchFamily="49" charset="0"/>
+                <a:cs typeface="Courier New" panose="02070309020205020404" pitchFamily="49" charset="0"/>
+              </a:rPr>
+              <a:t>::</a:t>
+            </a:r>
+            <a:r>
+              <a:rPr lang="en-US" dirty="0" err="1" smtClean="0">
+                <a:latin typeface="Courier New" panose="02070309020205020404" pitchFamily="49" charset="0"/>
+                <a:cs typeface="Courier New" panose="02070309020205020404" pitchFamily="49" charset="0"/>
+              </a:rPr>
+              <a:t>unique_lock</a:t>
+            </a:r>
+            <a:r>
+              <a:rPr lang="en-US" dirty="0" smtClean="0">
+                <a:latin typeface="Courier New" panose="02070309020205020404" pitchFamily="49" charset="0"/>
+                <a:cs typeface="Courier New" panose="02070309020205020404" pitchFamily="49" charset="0"/>
+              </a:rPr>
+              <a:t> </a:t>
+            </a:r>
+            <a:r>
+              <a:rPr lang="en-US" dirty="0" smtClean="0"/>
+              <a:t>– may not own a mutex</a:t>
+            </a:r>
+            <a:endParaRPr lang="en-US" dirty="0" smtClean="0"/>
+          </a:p>
+          <a:p>
+            <a:r>
+              <a:rPr lang="en-US" dirty="0" smtClean="0">
+                <a:solidFill>
+                  <a:schemeClr val="accent3"/>
+                </a:solidFill>
+              </a:rPr>
+              <a:t>Guidelines: </a:t>
+            </a:r>
+          </a:p>
+          <a:p>
+            <a:pPr marL="800100" lvl="1" indent="-342900"/>
+            <a:r>
+              <a:rPr lang="en-US" dirty="0" smtClean="0">
+                <a:solidFill>
+                  <a:schemeClr val="accent3"/>
+                </a:solidFill>
+              </a:rPr>
+              <a:t>Don’t call lock or unlock on a </a:t>
+            </a:r>
+            <a:r>
+              <a:rPr lang="en-US" dirty="0" err="1" smtClean="0">
+                <a:solidFill>
+                  <a:schemeClr val="accent3"/>
+                </a:solidFill>
+                <a:latin typeface="Courier New" panose="02070309020205020404" pitchFamily="49" charset="0"/>
+                <a:cs typeface="Courier New" panose="02070309020205020404" pitchFamily="49" charset="0"/>
+              </a:rPr>
+              <a:t>std</a:t>
+            </a:r>
+            <a:r>
+              <a:rPr lang="en-US" dirty="0" smtClean="0">
                 <a:solidFill>
                   <a:schemeClr val="accent3"/>
                 </a:solidFill>
@@ -5040,7 +5167,61 @@
                   <a:schemeClr val="accent3"/>
                 </a:solidFill>
               </a:rPr>
-              <a:t> with each </a:t>
+              <a:t> </a:t>
+            </a:r>
+            <a:r>
+              <a:rPr lang="en-US" dirty="0" smtClean="0">
+                <a:solidFill>
+                  <a:schemeClr val="accent3"/>
+                </a:solidFill>
+              </a:rPr>
+              <a:t>or </a:t>
+            </a:r>
+            <a:r>
+              <a:rPr lang="en-US" dirty="0" err="1" smtClean="0">
+                <a:solidFill>
+                  <a:schemeClr val="accent3"/>
+                </a:solidFill>
+                <a:latin typeface="Courier New" panose="02070309020205020404" pitchFamily="49" charset="0"/>
+                <a:cs typeface="Courier New" panose="02070309020205020404" pitchFamily="49" charset="0"/>
+              </a:rPr>
+              <a:t>std</a:t>
+            </a:r>
+            <a:r>
+              <a:rPr lang="en-US" dirty="0" smtClean="0">
+                <a:solidFill>
+                  <a:schemeClr val="accent3"/>
+                </a:solidFill>
+                <a:latin typeface="Courier New" panose="02070309020205020404" pitchFamily="49" charset="0"/>
+                <a:cs typeface="Courier New" panose="02070309020205020404" pitchFamily="49" charset="0"/>
+              </a:rPr>
+              <a:t>::</a:t>
+            </a:r>
+            <a:r>
+              <a:rPr lang="en-US" dirty="0" err="1" smtClean="0">
+                <a:solidFill>
+                  <a:schemeClr val="accent3"/>
+                </a:solidFill>
+                <a:latin typeface="Courier New" panose="02070309020205020404" pitchFamily="49" charset="0"/>
+                <a:cs typeface="Courier New" panose="02070309020205020404" pitchFamily="49" charset="0"/>
+              </a:rPr>
+              <a:t>unique_lock</a:t>
+            </a:r>
+            <a:r>
+              <a:rPr lang="en-US" dirty="0" smtClean="0">
+                <a:solidFill>
+                  <a:schemeClr val="accent3"/>
+                </a:solidFill>
+              </a:rPr>
+              <a:t> with </a:t>
+            </a:r>
+            <a:r>
+              <a:rPr lang="en-US" dirty="0" smtClean="0">
+                <a:solidFill>
+                  <a:schemeClr val="accent3"/>
+                </a:solidFill>
+              </a:rPr>
+              <a:t>each </a:t>
             </a:r>
             <a:r>
               <a:rPr lang="en-US" dirty="0" err="1" smtClean="0">

</xml_diff>

<commit_message>
Update the mutex lecture and add lecture notes.
</commit_message>
<xml_diff>
--- a/Lectures/Mutexes/Mutexes.pptx
+++ b/Lectures/Mutexes/Mutexes.pptx
@@ -201,7 +201,7 @@
           <a:p>
             <a:fld id="{DBE0ECA1-3FBF-48AE-AD2A-4439AE745E19}" type="datetimeFigureOut">
               <a:rPr lang="en-US" smtClean="0"/>
-              <a:t>11/12/2013</a:t>
+              <a:t>1/22/2014</a:t>
             </a:fld>
             <a:endParaRPr lang="en-US"/>
           </a:p>
@@ -662,7 +662,7 @@
           <a:p>
             <a:fld id="{9769DED8-28D4-45B9-A00F-7CFE9335FEA6}" type="datetime1">
               <a:rPr lang="en-US" smtClean="0"/>
-              <a:t>11/12/2013</a:t>
+              <a:t>1/22/2014</a:t>
             </a:fld>
             <a:endParaRPr lang="en-US"/>
           </a:p>
@@ -927,7 +927,7 @@
           <a:p>
             <a:fld id="{2DB3D439-1F88-44B4-B5F7-F9BCD4064257}" type="datetime1">
               <a:rPr lang="en-US" smtClean="0"/>
-              <a:t>11/12/2013</a:t>
+              <a:t>1/22/2014</a:t>
             </a:fld>
             <a:endParaRPr lang="en-US"/>
           </a:p>
@@ -1102,7 +1102,7 @@
           <a:p>
             <a:fld id="{99C5638F-6F55-4055-935C-67841BE78C36}" type="datetime1">
               <a:rPr lang="en-US" smtClean="0"/>
-              <a:t>11/12/2013</a:t>
+              <a:t>1/22/2014</a:t>
             </a:fld>
             <a:endParaRPr lang="en-US"/>
           </a:p>
@@ -1267,7 +1267,7 @@
           <a:p>
             <a:fld id="{E6987D90-0C92-4B22-A29D-FED15412CED2}" type="datetime1">
               <a:rPr lang="en-US" smtClean="0"/>
-              <a:t>11/12/2013</a:t>
+              <a:t>1/22/2014</a:t>
             </a:fld>
             <a:endParaRPr lang="en-US"/>
           </a:p>
@@ -1516,7 +1516,7 @@
           <a:p>
             <a:fld id="{DDB67BC4-9554-49E0-BCB3-D1EF965BA0B8}" type="datetime1">
               <a:rPr lang="en-US" smtClean="0"/>
-              <a:t>11/12/2013</a:t>
+              <a:t>1/22/2014</a:t>
             </a:fld>
             <a:endParaRPr lang="en-US"/>
           </a:p>
@@ -1799,7 +1799,7 @@
           <a:p>
             <a:fld id="{EC24D770-803D-4E01-921C-9C100DD8230C}" type="datetime1">
               <a:rPr lang="en-US" smtClean="0"/>
-              <a:t>11/12/2013</a:t>
+              <a:t>1/22/2014</a:t>
             </a:fld>
             <a:endParaRPr lang="en-US"/>
           </a:p>
@@ -2238,7 +2238,7 @@
           <a:p>
             <a:fld id="{356AD44B-78A4-4209-8070-7DCBE2DC4992}" type="datetime1">
               <a:rPr lang="en-US" smtClean="0"/>
-              <a:t>11/12/2013</a:t>
+              <a:t>1/22/2014</a:t>
             </a:fld>
             <a:endParaRPr lang="en-US"/>
           </a:p>
@@ -2351,7 +2351,7 @@
           <a:p>
             <a:fld id="{A993C59A-7CA2-467F-B7F1-9096881A01B8}" type="datetime1">
               <a:rPr lang="en-US" smtClean="0"/>
-              <a:t>11/12/2013</a:t>
+              <a:t>1/22/2014</a:t>
             </a:fld>
             <a:endParaRPr lang="en-US"/>
           </a:p>
@@ -2441,7 +2441,7 @@
           <a:p>
             <a:fld id="{2B6B58D0-2488-434A-8ED1-692E09B85CC5}" type="datetime1">
               <a:rPr lang="en-US" smtClean="0"/>
-              <a:t>11/12/2013</a:t>
+              <a:t>1/22/2014</a:t>
             </a:fld>
             <a:endParaRPr lang="en-US"/>
           </a:p>
@@ -2683,7 +2683,7 @@
           <a:p>
             <a:fld id="{FDB0AFC2-7D64-4F61-A7B7-9932D3305DDA}" type="datetime1">
               <a:rPr lang="en-US" smtClean="0"/>
-              <a:t>11/12/2013</a:t>
+              <a:t>1/22/2014</a:t>
             </a:fld>
             <a:endParaRPr lang="en-US"/>
           </a:p>
@@ -2977,7 +2977,7 @@
           <a:p>
             <a:fld id="{4983D17A-D7B2-4ECE-8A2C-93679B9D177B}" type="datetime1">
               <a:rPr lang="en-US" smtClean="0"/>
-              <a:t>11/12/2013</a:t>
+              <a:t>1/22/2014</a:t>
             </a:fld>
             <a:endParaRPr lang="en-US"/>
           </a:p>
@@ -3271,7 +3271,7 @@
           <a:p>
             <a:fld id="{2A5275F7-419E-4C23-8A3D-2EE5742B2EC9}" type="datetime1">
               <a:rPr lang="en-US" smtClean="0"/>
-              <a:t>11/12/2013</a:t>
+              <a:t>1/22/2014</a:t>
             </a:fld>
             <a:endParaRPr lang="en-US"/>
           </a:p>
@@ -4075,7 +4075,23 @@
                   <a:schemeClr val="accent3"/>
                 </a:solidFill>
               </a:rPr>
-              <a:t>nested locks - do not acquire another lock if your already have one</a:t>
+              <a:t>nested </a:t>
+            </a:r>
+            <a:r>
+              <a:rPr lang="en-US" dirty="0" smtClean="0">
+                <a:solidFill>
+                  <a:schemeClr val="accent3"/>
+                </a:solidFill>
+              </a:rPr>
+              <a:t>locks – do </a:t>
+            </a:r>
+            <a:r>
+              <a:rPr lang="en-US" dirty="0">
+                <a:solidFill>
+                  <a:schemeClr val="accent3"/>
+                </a:solidFill>
+              </a:rPr>
+              <a:t>not acquire another lock if your already have one</a:t>
             </a:r>
           </a:p>
           <a:p>
@@ -4717,14 +4733,30 @@
             <a:pPr marL="1485900" lvl="2" indent="-342900"/>
             <a:r>
               <a:rPr lang="en-US" dirty="0" smtClean="0"/>
-              <a:t>A mutex is locked to prevent sharing</a:t>
+              <a:t>A mutex is </a:t>
+            </a:r>
+            <a:r>
+              <a:rPr lang="en-US" i="1" dirty="0" smtClean="0"/>
+              <a:t>locked</a:t>
+            </a:r>
+            <a:r>
+              <a:rPr lang="en-US" dirty="0" smtClean="0"/>
+              <a:t> to prevent sharing</a:t>
             </a:r>
           </a:p>
           <a:p>
             <a:pPr marL="1485900" lvl="2" indent="-342900"/>
             <a:r>
               <a:rPr lang="en-US" dirty="0" smtClean="0"/>
-              <a:t>It is unlocked to allow sharing</a:t>
+              <a:t>It is </a:t>
+            </a:r>
+            <a:r>
+              <a:rPr lang="en-US" i="1" dirty="0" smtClean="0"/>
+              <a:t>unlocked</a:t>
+            </a:r>
+            <a:r>
+              <a:rPr lang="en-US" dirty="0" smtClean="0"/>
+              <a:t> to allow sharing</a:t>
             </a:r>
           </a:p>
           <a:p>
@@ -4980,11 +5012,7 @@
             <a:pPr marL="800100" lvl="1" indent="-342900"/>
             <a:r>
               <a:rPr lang="en-US" dirty="0" smtClean="0"/>
-              <a:t>A new return statement will prevent the mutex from being </a:t>
-            </a:r>
-            <a:r>
-              <a:rPr lang="en-US" dirty="0" smtClean="0"/>
-              <a:t>unlocked</a:t>
+              <a:t>A new return statement will prevent the mutex from being unlocked</a:t>
             </a:r>
           </a:p>
           <a:p>
@@ -5070,7 +5098,6 @@
               <a:rPr lang="en-US" dirty="0" smtClean="0"/>
               <a:t>– may not own a mutex</a:t>
             </a:r>
-            <a:endParaRPr lang="en-US" dirty="0" smtClean="0"/>
           </a:p>
           <a:p>
             <a:r>
@@ -5167,15 +5194,7 @@
                   <a:schemeClr val="accent3"/>
                 </a:solidFill>
               </a:rPr>
-              <a:t> </a:t>
-            </a:r>
-            <a:r>
-              <a:rPr lang="en-US" dirty="0" smtClean="0">
-                <a:solidFill>
-                  <a:schemeClr val="accent3"/>
-                </a:solidFill>
-              </a:rPr>
-              <a:t>or </a:t>
+              <a:t> or </a:t>
             </a:r>
             <a:r>
               <a:rPr lang="en-US" dirty="0" err="1" smtClean="0">
@@ -5213,15 +5232,7 @@
                   <a:schemeClr val="accent3"/>
                 </a:solidFill>
               </a:rPr>
-              <a:t> with </a:t>
-            </a:r>
-            <a:r>
-              <a:rPr lang="en-US" dirty="0" smtClean="0">
-                <a:solidFill>
-                  <a:schemeClr val="accent3"/>
-                </a:solidFill>
-              </a:rPr>
-              <a:t>each </a:t>
+              <a:t> with each </a:t>
             </a:r>
             <a:r>
               <a:rPr lang="en-US" dirty="0" err="1" smtClean="0">
@@ -5698,8 +5709,13 @@
             <a:pPr marL="342900" indent="-342900"/>
             <a:r>
               <a:rPr lang="en-US" dirty="0" smtClean="0"/>
-              <a:t>A deadlock requires</a:t>
-            </a:r>
+              <a:t>A deadlock </a:t>
+            </a:r>
+            <a:r>
+              <a:rPr lang="en-US" dirty="0" smtClean="0"/>
+              <a:t>usually involves</a:t>
+            </a:r>
+            <a:endParaRPr lang="en-US" dirty="0" smtClean="0"/>
           </a:p>
           <a:p>
             <a:pPr marL="800100" lvl="1" indent="-342900"/>
@@ -5861,7 +5877,47 @@
                   <a:schemeClr val="accent3"/>
                 </a:solidFill>
               </a:rPr>
-              <a:t>Avoid nested locks - do not acquire another lock if your already have one</a:t>
+              <a:t>Avoid </a:t>
+            </a:r>
+            <a:r>
+              <a:rPr lang="en-US" smtClean="0">
+                <a:solidFill>
+                  <a:schemeClr val="accent3"/>
+                </a:solidFill>
+              </a:rPr>
+              <a:t>nested </a:t>
+            </a:r>
+            <a:r>
+              <a:rPr lang="en-US" smtClean="0">
+                <a:solidFill>
+                  <a:schemeClr val="accent3"/>
+                </a:solidFill>
+              </a:rPr>
+              <a:t>locks – </a:t>
+            </a:r>
+            <a:r>
+              <a:rPr lang="en-US" dirty="0" smtClean="0">
+                <a:solidFill>
+                  <a:schemeClr val="accent3"/>
+                </a:solidFill>
+              </a:rPr>
+              <a:t>do not acquire another lock if </a:t>
+            </a:r>
+            <a:r>
+              <a:rPr lang="en-US" dirty="0" smtClean="0">
+                <a:solidFill>
+                  <a:schemeClr val="accent3"/>
+                </a:solidFill>
+              </a:rPr>
+              <a:t>you </a:t>
+            </a:r>
+            <a:r>
+              <a:rPr lang="en-US" dirty="0" smtClean="0">
+                <a:solidFill>
+                  <a:schemeClr val="accent3"/>
+                </a:solidFill>
+              </a:rPr>
+              <a:t>already have one</a:t>
             </a:r>
           </a:p>
           <a:p>

</xml_diff>